<commit_message>
changed headers to make tables easier to read
</commit_message>
<xml_diff>
--- a/IXIS_data_challenge_slidedeck.pptx
+++ b/IXIS_data_challenge_slidedeck.pptx
@@ -9,6 +9,7 @@
     <p:sldId id="258" r:id="rId3"/>
     <p:sldId id="259" r:id="rId4"/>
     <p:sldId id="260" r:id="rId5"/>
+    <p:sldId id="261" r:id="rId6"/>
   </p:sldIdLst>
   <p:sldSz cx="12192000" cy="6858000"/>
   <p:notesSz cx="6858000" cy="9144000"/>
@@ -107,6 +108,11 @@
       </a:defRPr>
     </a:lvl9pPr>
   </p:defaultTextStyle>
+  <p:extLst>
+    <p:ext uri="{EFAFB233-063F-42B5-8137-9DF3F51BA10A}">
+      <p15:sldGuideLst xmlns:p15="http://schemas.microsoft.com/office/powerpoint/2012/main"/>
+    </p:ext>
+  </p:extLst>
 </p:presentation>
 </file>
 
@@ -3704,7 +3710,7 @@
           <a:p>
             <a:r>
               <a:rPr lang="en-US" sz="2400" dirty="0"/>
-              <a:t>Recommendations</a:t>
+              <a:t>Next Steps / Action Items</a:t>
             </a:r>
           </a:p>
           <a:p>
@@ -3823,7 +3829,7 @@
             </a:pPr>
             <a:r>
               <a:rPr lang="en-US" dirty="0"/>
-              <a:t>For desktop:   3.10% to 3.92%</a:t>
+              <a:t>For Desktop:   3.10% to 3.92%</a:t>
             </a:r>
           </a:p>
           <a:p>
@@ -3864,10 +3870,10 @@
       </p:sp>
       <p:pic>
         <p:nvPicPr>
-          <p:cNvPr id="18" name="Picture 17" descr="A picture containing table&#10;&#10;Description automatically generated">
+          <p:cNvPr id="4" name="Picture 3" descr="Table&#10;&#10;Description automatically generated">
             <a:extLst>
               <a:ext uri="{FF2B5EF4-FFF2-40B4-BE49-F238E27FC236}">
-                <a16:creationId xmlns:a16="http://schemas.microsoft.com/office/drawing/2014/main" id="{CF3DA99C-108E-11F5-6B5E-1BECA1193121}"/>
+                <a16:creationId xmlns:a16="http://schemas.microsoft.com/office/drawing/2014/main" id="{B3125B74-7739-5847-254D-0764815B63CC}"/>
               </a:ext>
             </a:extLst>
           </p:cNvPr>
@@ -3884,8 +3890,8 @@
         </p:blipFill>
         <p:spPr>
           <a:xfrm>
-            <a:off x="5096156" y="909610"/>
-            <a:ext cx="7068412" cy="5853623"/>
+            <a:off x="4966139" y="916921"/>
+            <a:ext cx="7198430" cy="5878015"/>
           </a:xfrm>
           <a:prstGeom prst="rect">
             <a:avLst/>
@@ -3952,21 +3958,122 @@
           </a:p>
         </p:txBody>
       </p:sp>
+      <p:sp>
+        <p:nvSpPr>
+          <p:cNvPr id="7" name="TextBox 6">
+            <a:extLst>
+              <a:ext uri="{FF2B5EF4-FFF2-40B4-BE49-F238E27FC236}">
+                <a16:creationId xmlns:a16="http://schemas.microsoft.com/office/drawing/2014/main" id="{CABAC30C-FB26-1E86-1D6A-39039CC1A6BF}"/>
+              </a:ext>
+            </a:extLst>
+          </p:cNvPr>
+          <p:cNvSpPr txBox="1"/>
+          <p:nvPr/>
+        </p:nvSpPr>
+        <p:spPr>
+          <a:xfrm>
+            <a:off x="92569" y="1516814"/>
+            <a:ext cx="5221224" cy="4093428"/>
+          </a:xfrm>
+          <a:prstGeom prst="rect">
+            <a:avLst/>
+          </a:prstGeom>
+          <a:noFill/>
+        </p:spPr>
+        <p:txBody>
+          <a:bodyPr wrap="square" rtlCol="0">
+            <a:spAutoFit/>
+          </a:bodyPr>
+          <a:lstStyle/>
+          <a:p>
+            <a:pPr marL="285750" indent="-285750">
+              <a:buFont typeface="Arial" panose="020B0604020202020204" pitchFamily="34" charset="0"/>
+              <a:buChar char="•"/>
+            </a:pPr>
+            <a:r>
+              <a:rPr lang="en-US" sz="2000" dirty="0"/>
+              <a:t>Focusing on the key metrics over the last 2 months (June 2013 vs. May 2013), we observe:</a:t>
+            </a:r>
+          </a:p>
+          <a:p>
+            <a:pPr marL="742950" lvl="1" indent="-285750">
+              <a:buFont typeface="Arial" panose="020B0604020202020204" pitchFamily="34" charset="0"/>
+              <a:buChar char="•"/>
+            </a:pPr>
+            <a:r>
+              <a:rPr lang="en-US" sz="2000" dirty="0" err="1"/>
+              <a:t>addsToCart</a:t>
+            </a:r>
+            <a:r>
+              <a:rPr lang="en-US" sz="2000" dirty="0"/>
+              <a:t>: decrease of 28750 or 21.10%</a:t>
+            </a:r>
+          </a:p>
+          <a:p>
+            <a:pPr marL="742950" lvl="1" indent="-285750">
+              <a:buFont typeface="Arial" panose="020B0604020202020204" pitchFamily="34" charset="0"/>
+              <a:buChar char="•"/>
+            </a:pPr>
+            <a:r>
+              <a:rPr lang="en-US" sz="2000" dirty="0"/>
+              <a:t>sessions: increase of 224195 or 19.25%</a:t>
+            </a:r>
+          </a:p>
+          <a:p>
+            <a:pPr marL="742950" lvl="1" indent="-285750">
+              <a:buFont typeface="Arial" panose="020B0604020202020204" pitchFamily="34" charset="0"/>
+              <a:buChar char="•"/>
+            </a:pPr>
+            <a:r>
+              <a:rPr lang="en-US" sz="2000" dirty="0"/>
+              <a:t>transactions: increase of 6149 or 21.66%</a:t>
+            </a:r>
+          </a:p>
+          <a:p>
+            <a:pPr marL="742950" lvl="1" indent="-285750">
+              <a:buFont typeface="Arial" panose="020B0604020202020204" pitchFamily="34" charset="0"/>
+              <a:buChar char="•"/>
+            </a:pPr>
+            <a:r>
+              <a:rPr lang="en-US" sz="2000" dirty="0"/>
+              <a:t>quantity (QTY):  increase of 10262 or 19.88%</a:t>
+            </a:r>
+          </a:p>
+          <a:p>
+            <a:pPr marL="742950" lvl="1" indent="-285750">
+              <a:buFont typeface="Arial" panose="020B0604020202020204" pitchFamily="34" charset="0"/>
+              <a:buChar char="•"/>
+            </a:pPr>
+            <a:r>
+              <a:rPr lang="en-US" sz="2000" dirty="0"/>
+              <a:t>ECR (transactions/sessions): slightly decrease by 0.05% (absolute) or relatively by 2%</a:t>
+            </a:r>
+          </a:p>
+          <a:p>
+            <a:pPr marL="742950" lvl="1" indent="-285750">
+              <a:buFont typeface="Arial" panose="020B0604020202020204" pitchFamily="34" charset="0"/>
+              <a:buChar char="•"/>
+            </a:pPr>
+            <a:r>
+              <a:rPr lang="en-US" sz="2000" dirty="0"/>
+              <a:t>quantity per transaction: decrease by 2.67% (absolute) or relatively by 1.47%</a:t>
+            </a:r>
+          </a:p>
+        </p:txBody>
+      </p:sp>
       <p:pic>
         <p:nvPicPr>
-          <p:cNvPr id="5" name="Content Placeholder 4" descr="Table&#10;&#10;Description automatically generated">
+          <p:cNvPr id="3" name="Picture 2">
             <a:extLst>
               <a:ext uri="{FF2B5EF4-FFF2-40B4-BE49-F238E27FC236}">
-                <a16:creationId xmlns:a16="http://schemas.microsoft.com/office/drawing/2014/main" id="{AFA15683-0835-85CB-8E96-DB6726BD5502}"/>
+                <a16:creationId xmlns:a16="http://schemas.microsoft.com/office/drawing/2014/main" id="{8AC86E6C-27A7-A0AC-41F5-D70AB5CF3F01}"/>
               </a:ext>
             </a:extLst>
           </p:cNvPr>
           <p:cNvPicPr>
-            <a:picLocks noGrp="1" noChangeAspect="1"/>
+            <a:picLocks noChangeAspect="1"/>
           </p:cNvPicPr>
-          <p:nvPr>
-            <p:ph idx="1"/>
-          </p:nvPr>
+          <p:nvPr/>
         </p:nvPicPr>
         <p:blipFill>
           <a:blip r:embed="rId2"/>
@@ -3976,118 +4083,146 @@
         </p:blipFill>
         <p:spPr>
           <a:xfrm>
-            <a:off x="5934456" y="1200722"/>
-            <a:ext cx="5663406" cy="3416998"/>
-          </a:xfrm>
-        </p:spPr>
-      </p:pic>
-      <p:sp>
-        <p:nvSpPr>
-          <p:cNvPr id="7" name="TextBox 6">
-            <a:extLst>
-              <a:ext uri="{FF2B5EF4-FFF2-40B4-BE49-F238E27FC236}">
-                <a16:creationId xmlns:a16="http://schemas.microsoft.com/office/drawing/2014/main" id="{CABAC30C-FB26-1E86-1D6A-39039CC1A6BF}"/>
-              </a:ext>
-            </a:extLst>
-          </p:cNvPr>
-          <p:cNvSpPr txBox="1"/>
-          <p:nvPr/>
-        </p:nvSpPr>
-        <p:spPr>
-          <a:xfrm>
-            <a:off x="182880" y="1200722"/>
-            <a:ext cx="5221224" cy="4093428"/>
+            <a:off x="5497689" y="1516814"/>
+            <a:ext cx="6511432" cy="4093428"/>
           </a:xfrm>
           <a:prstGeom prst="rect">
             <a:avLst/>
           </a:prstGeom>
-          <a:noFill/>
         </p:spPr>
-        <p:txBody>
-          <a:bodyPr wrap="square" rtlCol="0">
-            <a:spAutoFit/>
-          </a:bodyPr>
-          <a:lstStyle/>
-          <a:p>
-            <a:pPr marL="285750" indent="-285750">
-              <a:buFont typeface="Arial" panose="020B0604020202020204" pitchFamily="34" charset="0"/>
-              <a:buChar char="•"/>
-            </a:pPr>
-            <a:r>
-              <a:rPr lang="en-US" sz="2000" dirty="0"/>
-              <a:t>Focusing on the key metrics over the last 2 months (June 2013 vs. May 2013), we observe:</a:t>
-            </a:r>
-          </a:p>
-          <a:p>
-            <a:pPr marL="742950" lvl="1" indent="-285750">
-              <a:buFont typeface="Arial" panose="020B0604020202020204" pitchFamily="34" charset="0"/>
-              <a:buChar char="•"/>
-            </a:pPr>
-            <a:r>
-              <a:rPr lang="en-US" sz="2000" dirty="0" err="1"/>
-              <a:t>addsToCart</a:t>
-            </a:r>
-            <a:r>
-              <a:rPr lang="en-US" sz="2000" dirty="0"/>
-              <a:t>: decrease of 28750 or 21.10%</a:t>
-            </a:r>
-          </a:p>
-          <a:p>
-            <a:pPr marL="742950" lvl="1" indent="-285750">
-              <a:buFont typeface="Arial" panose="020B0604020202020204" pitchFamily="34" charset="0"/>
-              <a:buChar char="•"/>
-            </a:pPr>
-            <a:r>
-              <a:rPr lang="en-US" sz="2000" dirty="0"/>
-              <a:t>sessions: increase of 224195 or 19.25%</a:t>
-            </a:r>
-          </a:p>
-          <a:p>
-            <a:pPr marL="742950" lvl="1" indent="-285750">
-              <a:buFont typeface="Arial" panose="020B0604020202020204" pitchFamily="34" charset="0"/>
-              <a:buChar char="•"/>
-            </a:pPr>
-            <a:r>
-              <a:rPr lang="en-US" sz="2000" dirty="0"/>
-              <a:t>transactions: increase of 6149 or 21.66%</a:t>
-            </a:r>
-          </a:p>
-          <a:p>
-            <a:pPr marL="742950" lvl="1" indent="-285750">
-              <a:buFont typeface="Arial" panose="020B0604020202020204" pitchFamily="34" charset="0"/>
-              <a:buChar char="•"/>
-            </a:pPr>
-            <a:r>
-              <a:rPr lang="en-US" sz="2000" dirty="0"/>
-              <a:t>quantity (QTY):  increase of 10262 or 19.88%</a:t>
-            </a:r>
-          </a:p>
-          <a:p>
-            <a:pPr marL="742950" lvl="1" indent="-285750">
-              <a:buFont typeface="Arial" panose="020B0604020202020204" pitchFamily="34" charset="0"/>
-              <a:buChar char="•"/>
-            </a:pPr>
-            <a:r>
-              <a:rPr lang="en-US" sz="2000" dirty="0"/>
-              <a:t>ECR (transactions/sessions): slightly decrease by 0.05% (absolute) or relatively by 2%</a:t>
-            </a:r>
-          </a:p>
-          <a:p>
-            <a:pPr marL="742950" lvl="1" indent="-285750">
-              <a:buFont typeface="Arial" panose="020B0604020202020204" pitchFamily="34" charset="0"/>
-              <a:buChar char="•"/>
-            </a:pPr>
-            <a:r>
-              <a:rPr lang="en-US" sz="2000" dirty="0"/>
-              <a:t>quantity per transaction: decrease by 2.67% (absolute) or relatively by 1.47%</a:t>
-            </a:r>
-          </a:p>
-        </p:txBody>
-      </p:sp>
+      </p:pic>
     </p:spTree>
     <p:extLst>
       <p:ext uri="{BB962C8B-B14F-4D97-AF65-F5344CB8AC3E}">
         <p14:creationId xmlns:p14="http://schemas.microsoft.com/office/powerpoint/2010/main" val="1307661436"/>
+      </p:ext>
+    </p:extLst>
+  </p:cSld>
+  <p:clrMapOvr>
+    <a:masterClrMapping/>
+  </p:clrMapOvr>
+</p:sld>
+</file>
+
+<file path=ppt/slides/slide5.xml><?xml version="1.0" encoding="utf-8"?>
+<p:sld xmlns:a="http://schemas.openxmlformats.org/drawingml/2006/main" xmlns:r="http://schemas.openxmlformats.org/officeDocument/2006/relationships" xmlns:p="http://schemas.openxmlformats.org/presentationml/2006/main">
+  <p:cSld>
+    <p:spTree>
+      <p:nvGrpSpPr>
+        <p:cNvPr id="1" name=""/>
+        <p:cNvGrpSpPr/>
+        <p:nvPr/>
+      </p:nvGrpSpPr>
+      <p:grpSpPr>
+        <a:xfrm>
+          <a:off x="0" y="0"/>
+          <a:ext cx="0" cy="0"/>
+          <a:chOff x="0" y="0"/>
+          <a:chExt cx="0" cy="0"/>
+        </a:xfrm>
+      </p:grpSpPr>
+      <p:sp>
+        <p:nvSpPr>
+          <p:cNvPr id="2" name="Title 1">
+            <a:extLst>
+              <a:ext uri="{FF2B5EF4-FFF2-40B4-BE49-F238E27FC236}">
+                <a16:creationId xmlns:a16="http://schemas.microsoft.com/office/drawing/2014/main" id="{0A3055A3-6D41-3559-8F42-2B7C024CF4E2}"/>
+              </a:ext>
+            </a:extLst>
+          </p:cNvPr>
+          <p:cNvSpPr>
+            <a:spLocks noGrp="1"/>
+          </p:cNvSpPr>
+          <p:nvPr>
+            <p:ph type="title"/>
+          </p:nvPr>
+        </p:nvSpPr>
+        <p:spPr/>
+        <p:txBody>
+          <a:bodyPr>
+            <a:normAutofit fontScale="90000"/>
+          </a:bodyPr>
+          <a:lstStyle/>
+          <a:p>
+            <a:r>
+              <a:rPr lang="en-US" dirty="0"/>
+              <a:t>Next Steps / Action Items</a:t>
+            </a:r>
+          </a:p>
+        </p:txBody>
+      </p:sp>
+      <p:sp>
+        <p:nvSpPr>
+          <p:cNvPr id="3" name="Content Placeholder 2">
+            <a:extLst>
+              <a:ext uri="{FF2B5EF4-FFF2-40B4-BE49-F238E27FC236}">
+                <a16:creationId xmlns:a16="http://schemas.microsoft.com/office/drawing/2014/main" id="{B8515426-51EB-E0CA-50F7-3BC40A036A3F}"/>
+              </a:ext>
+            </a:extLst>
+          </p:cNvPr>
+          <p:cNvSpPr>
+            <a:spLocks noGrp="1"/>
+          </p:cNvSpPr>
+          <p:nvPr>
+            <p:ph idx="1"/>
+          </p:nvPr>
+        </p:nvSpPr>
+        <p:spPr/>
+        <p:txBody>
+          <a:bodyPr/>
+          <a:lstStyle/>
+          <a:p>
+            <a:r>
+              <a:rPr lang="en-US" sz="2400" dirty="0"/>
+              <a:t>As the following items, I suggest:</a:t>
+            </a:r>
+          </a:p>
+          <a:p>
+            <a:pPr lvl="1"/>
+            <a:r>
+              <a:rPr lang="en-US" sz="2000" dirty="0"/>
+              <a:t>Matching the data variation month to prior year to identify some typical patterns month to month or season to season</a:t>
+            </a:r>
+          </a:p>
+          <a:p>
+            <a:pPr lvl="1"/>
+            <a:r>
+              <a:rPr lang="en-US" sz="2000" dirty="0"/>
+              <a:t>Correlating the marketing campaigns and events with variation of the data in order to better measure the benefits the the action taken relative the the company effort and investments.</a:t>
+            </a:r>
+          </a:p>
+          <a:p>
+            <a:pPr lvl="1"/>
+            <a:r>
+              <a:rPr lang="en-US" sz="2000" dirty="0"/>
+              <a:t>To closely report the key metrics by browser to make sure our users are as effective with each browser relative to the others to ensure our customers are having a good </a:t>
+            </a:r>
+            <a:r>
+              <a:rPr lang="en-US" sz="2000"/>
+              <a:t>experience among all </a:t>
+            </a:r>
+            <a:r>
+              <a:rPr lang="en-US" sz="2000" dirty="0"/>
+              <a:t>the browsers supported by our apps.  </a:t>
+            </a:r>
+          </a:p>
+          <a:p>
+            <a:pPr lvl="1"/>
+            <a:r>
+              <a:rPr lang="en-US" sz="2000" dirty="0"/>
+              <a:t>To add more automatically generated graphs to make slight variations of the key metrics easier to notice by the management team. </a:t>
+            </a:r>
+          </a:p>
+          <a:p>
+            <a:pPr lvl="1"/>
+            <a:endParaRPr lang="en-US" dirty="0"/>
+          </a:p>
+        </p:txBody>
+      </p:sp>
+    </p:spTree>
+    <p:extLst>
+      <p:ext uri="{BB962C8B-B14F-4D97-AF65-F5344CB8AC3E}">
+        <p14:creationId xmlns:p14="http://schemas.microsoft.com/office/powerpoint/2010/main" val="479468477"/>
       </p:ext>
     </p:extLst>
   </p:cSld>

</xml_diff>